<commit_message>
Aula POO Java 13Fev2025
</commit_message>
<xml_diff>
--- a/02 poo/02 Qua Teams Curso de Férias POO.pptx
+++ b/02 poo/02 Qua Teams Curso de Férias POO.pptx
@@ -6593,7 +6593,7 @@
                   <a:srgbClr val="FF0000"/>
                 </a:solidFill>
               </a:rPr>
-              <a:t>Cardinalidade</a:t>
+              <a:t>Multiplicidade</a:t>
             </a:r>
             <a:r>
               <a:rPr lang="pt-PT" altLang="pt-BR" b="1" dirty="0"/>
@@ -6602,11 +6602,17 @@
             <a:endParaRPr lang="pt-PT" altLang="pt-BR" dirty="0"/>
           </a:p>
           <a:p>
-            <a:pPr algn="just" hangingPunct="1">
-              <a:buFont typeface="Wingdings" panose="05000000000000000000" pitchFamily="2" charset="2"/>
-              <a:buChar char="Ø"/>
+            <a:pPr marL="0" indent="0" algn="just" hangingPunct="1">
+              <a:buNone/>
             </a:pPr>
-            <a:endParaRPr lang="pt-PT" altLang="pt-BR" dirty="0"/>
+            <a:r>
+              <a:rPr lang="pt-PT" altLang="pt-BR" dirty="0"/>
+              <a:t>      Nos diagramas relacionais: </a:t>
+            </a:r>
+            <a:r>
+              <a:rPr lang="pt-PT" altLang="pt-BR" b="1" dirty="0"/>
+              <a:t>Cardinalidade</a:t>
+            </a:r>
           </a:p>
           <a:p>
             <a:pPr algn="just" hangingPunct="1">
@@ -18087,7 +18093,7 @@
             </a:pPr>
             <a:r>
               <a:rPr lang="pt-BR" sz="2400" dirty="0"/>
-              <a:t>	</a:t>
+              <a:t>		</a:t>
             </a:r>
             <a:r>
               <a:rPr lang="pt-BR" sz="2400" dirty="0" err="1"/>
@@ -18098,12 +18104,28 @@
               <a:t> </a:t>
             </a:r>
             <a:r>
-              <a:rPr lang="pt-BR" sz="2400" b="1" dirty="0" err="1"/>
-              <a:t>class</a:t>
+              <a:rPr lang="pt-BR" sz="2400" dirty="0" err="1"/>
+              <a:t>int</a:t>
             </a:r>
             <a:r>
               <a:rPr lang="pt-BR" sz="2400" dirty="0"/>
-              <a:t> Calculadora{</a:t>
+              <a:t> calcula( </a:t>
+            </a:r>
+            <a:r>
+              <a:rPr lang="pt-BR" sz="2400" dirty="0" err="1"/>
+              <a:t>int</a:t>
+            </a:r>
+            <a:r>
+              <a:rPr lang="pt-BR" sz="2400" dirty="0"/>
+              <a:t> a, </a:t>
+            </a:r>
+            <a:r>
+              <a:rPr lang="pt-BR" sz="2400" dirty="0" err="1"/>
+              <a:t>int</a:t>
+            </a:r>
+            <a:r>
+              <a:rPr lang="pt-BR" sz="2400" dirty="0"/>
+              <a:t> b){</a:t>
             </a:r>
           </a:p>
           <a:p>
@@ -18112,11 +18134,11 @@
             </a:pPr>
             <a:r>
               <a:rPr lang="pt-BR" sz="2400" dirty="0"/>
-              <a:t> 		</a:t>
+              <a:t>    			</a:t>
             </a:r>
             <a:r>
               <a:rPr lang="pt-BR" sz="2400" dirty="0" err="1"/>
-              <a:t>public</a:t>
+              <a:t>return</a:t>
             </a:r>
             <a:r>
               <a:rPr lang="pt-BR" sz="2400" dirty="0"/>
@@ -18124,27 +18146,11 @@
             </a:r>
             <a:r>
               <a:rPr lang="pt-BR" sz="2400" dirty="0" err="1"/>
-              <a:t>int</a:t>
+              <a:t>a+b</a:t>
             </a:r>
             <a:r>
               <a:rPr lang="pt-BR" sz="2400" dirty="0"/>
-              <a:t> calcula( </a:t>
-            </a:r>
-            <a:r>
-              <a:rPr lang="pt-BR" sz="2400" dirty="0" err="1"/>
-              <a:t>int</a:t>
-            </a:r>
-            <a:r>
-              <a:rPr lang="pt-BR" sz="2400" dirty="0"/>
-              <a:t> a, </a:t>
-            </a:r>
-            <a:r>
-              <a:rPr lang="pt-BR" sz="2400" dirty="0" err="1"/>
-              <a:t>int</a:t>
-            </a:r>
-            <a:r>
-              <a:rPr lang="pt-BR" sz="2400" dirty="0"/>
-              <a:t> b){</a:t>
+              <a:t>;</a:t>
             </a:r>
           </a:p>
           <a:p>
@@ -18153,23 +18159,7 @@
             </a:pPr>
             <a:r>
               <a:rPr lang="pt-BR" sz="2400" dirty="0"/>
-              <a:t>    		</a:t>
-            </a:r>
-            <a:r>
-              <a:rPr lang="pt-BR" sz="2400" dirty="0" err="1"/>
-              <a:t>return</a:t>
-            </a:r>
-            <a:r>
-              <a:rPr lang="pt-BR" sz="2400" dirty="0"/>
-              <a:t> </a:t>
-            </a:r>
-            <a:r>
-              <a:rPr lang="pt-BR" sz="2400" dirty="0" err="1"/>
-              <a:t>a+b</a:t>
-            </a:r>
-            <a:r>
-              <a:rPr lang="pt-BR" sz="2400" dirty="0"/>
-              <a:t>;</a:t>
+              <a:t>  		}</a:t>
             </a:r>
           </a:p>
           <a:p>
@@ -18178,7 +18168,39 @@
             </a:pPr>
             <a:r>
               <a:rPr lang="pt-BR" sz="2400" dirty="0"/>
-              <a:t>  		}</a:t>
+              <a:t>  		</a:t>
+            </a:r>
+            <a:r>
+              <a:rPr lang="pt-BR" sz="2400" dirty="0" err="1"/>
+              <a:t>public</a:t>
+            </a:r>
+            <a:r>
+              <a:rPr lang="pt-BR" sz="2400" dirty="0"/>
+              <a:t> </a:t>
+            </a:r>
+            <a:r>
+              <a:rPr lang="pt-BR" sz="2400" dirty="0" err="1"/>
+              <a:t>double</a:t>
+            </a:r>
+            <a:r>
+              <a:rPr lang="pt-BR" sz="2400" dirty="0"/>
+              <a:t> calcula( </a:t>
+            </a:r>
+            <a:r>
+              <a:rPr lang="pt-BR" sz="2400" dirty="0" err="1"/>
+              <a:t>double</a:t>
+            </a:r>
+            <a:r>
+              <a:rPr lang="pt-BR" sz="2400" dirty="0"/>
+              <a:t> a, </a:t>
+            </a:r>
+            <a:r>
+              <a:rPr lang="pt-BR" sz="2400" dirty="0" err="1"/>
+              <a:t>double</a:t>
+            </a:r>
+            <a:r>
+              <a:rPr lang="pt-BR" sz="2400" dirty="0"/>
+              <a:t> b){</a:t>
             </a:r>
           </a:p>
           <a:p>
@@ -18187,11 +18209,11 @@
             </a:pPr>
             <a:r>
               <a:rPr lang="pt-BR" sz="2400" dirty="0"/>
-              <a:t>  		</a:t>
+              <a:t>     			</a:t>
             </a:r>
             <a:r>
               <a:rPr lang="pt-BR" sz="2400" dirty="0" err="1"/>
-              <a:t>public</a:t>
+              <a:t>return</a:t>
             </a:r>
             <a:r>
               <a:rPr lang="pt-BR" sz="2400" dirty="0"/>
@@ -18199,27 +18221,11 @@
             </a:r>
             <a:r>
               <a:rPr lang="pt-BR" sz="2400" dirty="0" err="1"/>
-              <a:t>double</a:t>
+              <a:t>a+b</a:t>
             </a:r>
             <a:r>
               <a:rPr lang="pt-BR" sz="2400" dirty="0"/>
-              <a:t> calcula( </a:t>
-            </a:r>
-            <a:r>
-              <a:rPr lang="pt-BR" sz="2400" dirty="0" err="1"/>
-              <a:t>double</a:t>
-            </a:r>
-            <a:r>
-              <a:rPr lang="pt-BR" sz="2400" dirty="0"/>
-              <a:t> a, </a:t>
-            </a:r>
-            <a:r>
-              <a:rPr lang="pt-BR" sz="2400" dirty="0" err="1"/>
-              <a:t>double</a:t>
-            </a:r>
-            <a:r>
-              <a:rPr lang="pt-BR" sz="2400" dirty="0"/>
-              <a:t> b){</a:t>
+              <a:t>;</a:t>
             </a:r>
           </a:p>
           <a:p>
@@ -18228,23 +18234,7 @@
             </a:pPr>
             <a:r>
               <a:rPr lang="pt-BR" sz="2400" dirty="0"/>
-              <a:t>     			</a:t>
-            </a:r>
-            <a:r>
-              <a:rPr lang="pt-BR" sz="2400" dirty="0" err="1"/>
-              <a:t>return</a:t>
-            </a:r>
-            <a:r>
-              <a:rPr lang="pt-BR" sz="2400" dirty="0"/>
-              <a:t> </a:t>
-            </a:r>
-            <a:r>
-              <a:rPr lang="pt-BR" sz="2400" dirty="0" err="1"/>
-              <a:t>a+b</a:t>
-            </a:r>
-            <a:r>
-              <a:rPr lang="pt-BR" sz="2400" dirty="0"/>
-              <a:t>;</a:t>
+              <a:t>  		}		</a:t>
             </a:r>
           </a:p>
           <a:p>
@@ -18253,7 +18243,39 @@
             </a:pPr>
             <a:r>
               <a:rPr lang="pt-BR" sz="2400" dirty="0"/>
-              <a:t>  		}		</a:t>
+              <a:t>   		</a:t>
+            </a:r>
+            <a:r>
+              <a:rPr lang="pt-BR" sz="2400" dirty="0" err="1"/>
+              <a:t>public</a:t>
+            </a:r>
+            <a:r>
+              <a:rPr lang="pt-BR" sz="2400" dirty="0"/>
+              <a:t> </a:t>
+            </a:r>
+            <a:r>
+              <a:rPr lang="pt-BR" sz="2400" dirty="0" err="1"/>
+              <a:t>String</a:t>
+            </a:r>
+            <a:r>
+              <a:rPr lang="pt-BR" sz="2400" dirty="0"/>
+              <a:t> calcula( </a:t>
+            </a:r>
+            <a:r>
+              <a:rPr lang="pt-BR" sz="2400" dirty="0" err="1"/>
+              <a:t>String</a:t>
+            </a:r>
+            <a:r>
+              <a:rPr lang="pt-BR" sz="2400" dirty="0"/>
+              <a:t> a, </a:t>
+            </a:r>
+            <a:r>
+              <a:rPr lang="pt-BR" sz="2400" dirty="0" err="1"/>
+              <a:t>String</a:t>
+            </a:r>
+            <a:r>
+              <a:rPr lang="pt-BR" sz="2400" dirty="0"/>
+              <a:t> b){</a:t>
             </a:r>
           </a:p>
           <a:p>
@@ -18262,11 +18284,11 @@
             </a:pPr>
             <a:r>
               <a:rPr lang="pt-BR" sz="2400" dirty="0"/>
-              <a:t>   		</a:t>
+              <a:t>     			</a:t>
             </a:r>
             <a:r>
               <a:rPr lang="pt-BR" sz="2400" dirty="0" err="1"/>
-              <a:t>public</a:t>
+              <a:t>return</a:t>
             </a:r>
             <a:r>
               <a:rPr lang="pt-BR" sz="2400" dirty="0"/>
@@ -18274,27 +18296,11 @@
             </a:r>
             <a:r>
               <a:rPr lang="pt-BR" sz="2400" dirty="0" err="1"/>
-              <a:t>String</a:t>
+              <a:t>a+b</a:t>
             </a:r>
             <a:r>
               <a:rPr lang="pt-BR" sz="2400" dirty="0"/>
-              <a:t> calcula( </a:t>
-            </a:r>
-            <a:r>
-              <a:rPr lang="pt-BR" sz="2400" dirty="0" err="1"/>
-              <a:t>String</a:t>
-            </a:r>
-            <a:r>
-              <a:rPr lang="pt-BR" sz="2400" dirty="0"/>
-              <a:t> a, </a:t>
-            </a:r>
-            <a:r>
-              <a:rPr lang="pt-BR" sz="2400" dirty="0" err="1"/>
-              <a:t>String</a:t>
-            </a:r>
-            <a:r>
-              <a:rPr lang="pt-BR" sz="2400" dirty="0"/>
-              <a:t> b){</a:t>
+              <a:t>; 		</a:t>
             </a:r>
           </a:p>
           <a:p>
@@ -18303,23 +18309,7 @@
             </a:pPr>
             <a:r>
               <a:rPr lang="pt-BR" sz="2400" dirty="0"/>
-              <a:t>     			</a:t>
-            </a:r>
-            <a:r>
-              <a:rPr lang="pt-BR" sz="2400" dirty="0" err="1"/>
-              <a:t>return</a:t>
-            </a:r>
-            <a:r>
-              <a:rPr lang="pt-BR" sz="2400" dirty="0"/>
-              <a:t> </a:t>
-            </a:r>
-            <a:r>
-              <a:rPr lang="pt-BR" sz="2400" dirty="0" err="1"/>
-              <a:t>a+b</a:t>
-            </a:r>
-            <a:r>
-              <a:rPr lang="pt-BR" sz="2400" dirty="0"/>
-              <a:t>; 		}</a:t>
+              <a:t>		}</a:t>
             </a:r>
           </a:p>
           <a:p>
@@ -18328,16 +18318,7 @@
             </a:pPr>
             <a:r>
               <a:rPr lang="pt-BR" sz="2400" dirty="0"/>
-              <a:t>    	}</a:t>
-            </a:r>
-          </a:p>
-          <a:p>
-            <a:pPr marL="0" indent="0" algn="just">
-              <a:buNone/>
-            </a:pPr>
-            <a:r>
-              <a:rPr lang="pt-BR" sz="2400" dirty="0"/>
-              <a:t> 	....</a:t>
+              <a:t>	....</a:t>
             </a:r>
           </a:p>
         </p:txBody>
@@ -18998,7 +18979,7 @@
           </a:ln>
           <a:extLst>
             <a:ext uri="{C572A759-6A51-4108-AA02-DFA0A04FC94B}">
-              <ma14:wrappingTextBoxFlag xmlns="" xmlns:ma14="http://schemas.microsoft.com/office/mac/drawingml/2011/main" val="1"/>
+              <ma14:wrappingTextBoxFlag xmlns:ma14="http://schemas.microsoft.com/office/mac/drawingml/2011/main" xmlns="" val="1"/>
             </a:ext>
           </a:extLst>
         </p:spPr>
@@ -19458,15 +19439,23 @@
             </a:pPr>
             <a:r>
               <a:rPr lang="pt-BR" sz="2400" dirty="0"/>
-              <a:t>     		calculadora </a:t>
+              <a:t>     		</a:t>
+            </a:r>
+            <a:r>
+              <a:rPr lang="pt-BR" sz="2400" dirty="0" err="1"/>
+              <a:t>Main</a:t>
+            </a:r>
+            <a:r>
+              <a:rPr lang="pt-BR" sz="2400" dirty="0"/>
+              <a:t> </a:t>
             </a:r>
             <a:r>
               <a:rPr lang="pt-BR" sz="2400" dirty="0" err="1"/>
               <a:t>calc</a:t>
             </a:r>
             <a:r>
-              <a:rPr lang="pt-BR" sz="2400" dirty="0"/>
-              <a:t>= </a:t>
+              <a:rPr lang="pt-BR" sz="2400"/>
+              <a:t> = </a:t>
             </a:r>
             <a:r>
               <a:rPr lang="pt-BR" sz="2400" b="1" dirty="0"/>
@@ -19474,7 +19463,15 @@
             </a:r>
             <a:r>
               <a:rPr lang="pt-BR" sz="2400" dirty="0"/>
-              <a:t> calculadora();</a:t>
+              <a:t> </a:t>
+            </a:r>
+            <a:r>
+              <a:rPr lang="pt-BR" sz="2400" dirty="0" err="1"/>
+              <a:t>Main</a:t>
+            </a:r>
+            <a:r>
+              <a:rPr lang="pt-BR" sz="2400" dirty="0"/>
+              <a:t>();</a:t>
             </a:r>
           </a:p>
           <a:p>

</xml_diff>